<commit_message>
Avancement dans la rédaction finale
</commit_message>
<xml_diff>
--- a/Livrables/Brewery and Co.pptx
+++ b/Livrables/Brewery and Co.pptx
@@ -2865,7 +2865,7 @@
           <a:p>
             <a:fld id="{76B3F2C8-1B63-984A-8C9D-2402B4577158}" type="datetimeFigureOut">
               <a:rPr lang="fr-FR" smtClean="0"/>
-              <a:t>16/06/2016</a:t>
+              <a:t>28/06/2016</a:t>
             </a:fld>
             <a:endParaRPr lang="fr-FR"/>
           </a:p>
@@ -3030,7 +3030,7 @@
           <a:p>
             <a:fld id="{FA4CF6AE-097E-314A-AF67-34E683B9D313}" type="datetimeFigureOut">
               <a:rPr lang="fr-FR" smtClean="0"/>
-              <a:t>16/06/2016</a:t>
+              <a:t>28/06/2016</a:t>
             </a:fld>
             <a:endParaRPr lang="fr-FR"/>
           </a:p>
@@ -9191,8 +9191,29 @@
             <a:pPr lvl="1"/>
             <a:r>
               <a:rPr lang="fr-FR" dirty="0" smtClean="0"/>
-              <a:t>Pour rappel : 27’792 kilogrammes de matières première et 72’000 unités </a:t>
-            </a:r>
+              <a:t>Pour rappel : </a:t>
+            </a:r>
+            <a:r>
+              <a:rPr lang="fr-FR" dirty="0" smtClean="0"/>
+              <a:t>1’719 </a:t>
+            </a:r>
+            <a:r>
+              <a:rPr lang="fr-FR" dirty="0" smtClean="0"/>
+              <a:t>kilogrammes de matières </a:t>
+            </a:r>
+            <a:r>
+              <a:rPr lang="fr-FR" dirty="0" smtClean="0"/>
+              <a:t>première,  120 m3 d’eau </a:t>
+            </a:r>
+            <a:r>
+              <a:rPr lang="fr-FR" dirty="0" smtClean="0"/>
+              <a:t>et </a:t>
+            </a:r>
+            <a:r>
+              <a:rPr lang="fr-FR" dirty="0" smtClean="0"/>
+              <a:t>50’000 unités cannettes ou bouteilles</a:t>
+            </a:r>
+            <a:endParaRPr lang="fr-FR" dirty="0" smtClean="0"/>
           </a:p>
           <a:p>
             <a:r>
@@ -9220,14 +9241,30 @@
             <a:pPr lvl="1"/>
             <a:r>
               <a:rPr lang="fr-FR" dirty="0" smtClean="0"/>
-              <a:t>5’000 kilogrammes sont facturés à 200.- CHF/jour</a:t>
+              <a:t>10 </a:t>
+            </a:r>
+            <a:r>
+              <a:rPr lang="fr-FR" dirty="0" smtClean="0"/>
+              <a:t>kilogrammes sont facturés à </a:t>
+            </a:r>
+            <a:r>
+              <a:rPr lang="fr-FR" dirty="0" smtClean="0"/>
+              <a:t>100</a:t>
+            </a:r>
+            <a:r>
+              <a:rPr lang="fr-FR" dirty="0" smtClean="0"/>
+              <a:t>.- CHF/jour</a:t>
             </a:r>
           </a:p>
           <a:p>
             <a:pPr lvl="1"/>
             <a:r>
               <a:rPr lang="fr-FR" dirty="0" smtClean="0"/>
-              <a:t>10’000 unités sont facturées au prix de 200.- CHF/jour</a:t>
+              <a:t>12’000 </a:t>
+            </a:r>
+            <a:r>
+              <a:rPr lang="fr-FR" dirty="0" smtClean="0"/>
+              <a:t>unités sont facturées au prix de 200.- CHF/jour</a:t>
             </a:r>
             <a:endParaRPr lang="fr-FR" dirty="0"/>
           </a:p>
@@ -9338,18 +9375,26 @@
           <a:p>
             <a:r>
               <a:rPr lang="fr-FR" dirty="0" smtClean="0"/>
-              <a:t>Main d’œuvre directe 2 personnes :</a:t>
+              <a:t>Main d’œuvre directe </a:t>
+            </a:r>
+            <a:r>
+              <a:rPr lang="fr-FR" dirty="0" smtClean="0"/>
+              <a:t>1 </a:t>
+            </a:r>
+            <a:r>
+              <a:rPr lang="fr-FR" dirty="0" smtClean="0"/>
+              <a:t>personnes :</a:t>
             </a:r>
           </a:p>
           <a:p>
             <a:pPr lvl="1"/>
             <a:r>
-              <a:rPr lang="fr-FR" dirty="0"/>
-              <a:t>C</a:t>
-            </a:r>
-            <a:r>
               <a:rPr lang="fr-FR" dirty="0" smtClean="0"/>
-              <a:t>ollaborateurs responsables du bon fonctionnement des lignes de production (technique, révision et hygiène)</a:t>
+              <a:t>Collaborateur responsable </a:t>
+            </a:r>
+            <a:r>
+              <a:rPr lang="fr-FR" dirty="0" smtClean="0"/>
+              <a:t>du bon fonctionnement des lignes de production (technique, révision et hygiène)</a:t>
             </a:r>
           </a:p>
           <a:p>
@@ -9485,14 +9530,30 @@
           </a:p>
           <a:p>
             <a:r>
+              <a:rPr lang="fr-FR" dirty="0"/>
+              <a:t>5</a:t>
+            </a:r>
+            <a:r>
               <a:rPr lang="fr-FR" dirty="0" smtClean="0"/>
-              <a:t>10’000.- CHF pour la main d’œuvre direct</a:t>
-            </a:r>
-          </a:p>
-          <a:p>
+              <a:t>’000</a:t>
+            </a:r>
             <a:r>
               <a:rPr lang="fr-FR" dirty="0" smtClean="0"/>
-              <a:t>25’000.- CHF pour les SG&amp;A (ventes, généraux et administratifs)</a:t>
+              <a:t>.- CHF pour la main d’œuvre direct</a:t>
+            </a:r>
+          </a:p>
+          <a:p>
+            <a:r>
+              <a:rPr lang="fr-FR" dirty="0" smtClean="0"/>
+              <a:t>30</a:t>
+            </a:r>
+            <a:r>
+              <a:rPr lang="fr-FR" dirty="0" smtClean="0"/>
+              <a:t>’000</a:t>
+            </a:r>
+            <a:r>
+              <a:rPr lang="fr-FR" dirty="0" smtClean="0"/>
+              <a:t>.- CHF pour les SG&amp;A (ventes, généraux et administratifs)</a:t>
             </a:r>
           </a:p>
           <a:p>
@@ -16422,19 +16483,7 @@
           <a:p>
             <a:r>
               <a:rPr lang="fr-FR" dirty="0" smtClean="0"/>
-              <a:t>Durant l’année </a:t>
-            </a:r>
-            <a:r>
-              <a:rPr lang="fr-FR" dirty="0" smtClean="0"/>
-              <a:t>le volume de </a:t>
-            </a:r>
-            <a:r>
-              <a:rPr lang="fr-FR" dirty="0" smtClean="0"/>
-              <a:t>demande </a:t>
-            </a:r>
-            <a:r>
-              <a:rPr lang="fr-FR" dirty="0" smtClean="0"/>
-              <a:t>évolue :</a:t>
+              <a:t>Durant l’année le volume de demande évolue :</a:t>
             </a:r>
           </a:p>
           <a:p>
@@ -18739,7 +18788,12 @@
             <p:ph sz="quarter" idx="10"/>
           </p:nvPr>
         </p:nvSpPr>
-        <p:spPr/>
+        <p:spPr>
+          <a:xfrm>
+            <a:off x="838200" y="1811337"/>
+            <a:ext cx="10515600" cy="4441495"/>
+          </a:xfrm>
+        </p:spPr>
         <p:txBody>
           <a:bodyPr>
             <a:normAutofit fontScale="85000" lnSpcReduction="20000"/>
@@ -18766,27 +18820,42 @@
             <a:pPr lvl="1"/>
             <a:r>
               <a:rPr lang="fr-FR" dirty="0" smtClean="0"/>
-              <a:t>Valeur de 150’000.- CHF par ligne</a:t>
-            </a:r>
+              <a:t>Valeur de </a:t>
+            </a:r>
+            <a:r>
+              <a:rPr lang="fr-FR" dirty="0" smtClean="0"/>
+              <a:t>450’000.-</a:t>
+            </a:r>
+            <a:endParaRPr lang="fr-FR" dirty="0" smtClean="0"/>
           </a:p>
           <a:p>
             <a:pPr lvl="1"/>
             <a:r>
               <a:rPr lang="fr-FR" dirty="0" smtClean="0"/>
-              <a:t>Capacité mensuelle de 12’000 litres totales</a:t>
-            </a:r>
+              <a:t>12’000 litres productibles mensuellement</a:t>
+            </a:r>
+            <a:endParaRPr lang="fr-FR" dirty="0" smtClean="0"/>
           </a:p>
           <a:p>
             <a:r>
               <a:rPr lang="fr-CH" dirty="0" smtClean="0"/>
-              <a:t>Entrepôt matières premières de 27’792 kg</a:t>
-            </a:r>
+              <a:t>Entrepôt </a:t>
+            </a:r>
+            <a:r>
+              <a:rPr lang="fr-CH" dirty="0" smtClean="0"/>
+              <a:t>A</a:t>
+            </a:r>
+            <a:endParaRPr lang="fr-CH" dirty="0" smtClean="0"/>
           </a:p>
           <a:p>
             <a:pPr lvl="1"/>
             <a:r>
               <a:rPr lang="fr-CH" dirty="0" smtClean="0"/>
-              <a:t>Une bassine d’eau pure de 24 m</a:t>
+              <a:t>Une bassine d’eau pure de </a:t>
+            </a:r>
+            <a:r>
+              <a:rPr lang="fr-CH" dirty="0" smtClean="0"/>
+              <a:t>120 m</a:t>
             </a:r>
             <a:r>
               <a:rPr lang="fr-CH" baseline="30000" dirty="0" smtClean="0"/>
@@ -18796,47 +18865,91 @@
               <a:rPr lang="fr-CH" dirty="0" smtClean="0"/>
               <a:t> </a:t>
             </a:r>
+            <a:endParaRPr lang="fr-CH" dirty="0" smtClean="0"/>
           </a:p>
           <a:p>
             <a:pPr lvl="1"/>
             <a:r>
               <a:rPr lang="fr-CH" dirty="0" smtClean="0"/>
-              <a:t>Réceptacle à malts de 3 tonnes chacun</a:t>
-            </a:r>
+              <a:t>4 r</a:t>
+            </a:r>
+            <a:r>
+              <a:rPr lang="fr-CH" dirty="0" smtClean="0"/>
+              <a:t>éceptacles </a:t>
+            </a:r>
+            <a:r>
+              <a:rPr lang="fr-CH" dirty="0" smtClean="0"/>
+              <a:t>à malts de </a:t>
+            </a:r>
+            <a:r>
+              <a:rPr lang="fr-CH" dirty="0" smtClean="0"/>
+              <a:t>350 kg chaque</a:t>
+            </a:r>
+            <a:endParaRPr lang="fr-CH" dirty="0" smtClean="0"/>
           </a:p>
           <a:p>
             <a:pPr lvl="1"/>
             <a:r>
               <a:rPr lang="fr-CH" dirty="0" smtClean="0"/>
-              <a:t>Réceptacle à houblon de 48 kilogrammes</a:t>
+              <a:t>4 réceptacles </a:t>
+            </a:r>
+            <a:r>
+              <a:rPr lang="fr-CH" dirty="0" smtClean="0"/>
+              <a:t>à houblon </a:t>
+            </a:r>
+            <a:r>
+              <a:rPr lang="fr-CH" dirty="0" smtClean="0"/>
+              <a:t>de 6 kg chaque</a:t>
             </a:r>
           </a:p>
           <a:p>
             <a:pPr lvl="1"/>
             <a:r>
               <a:rPr lang="fr-CH" dirty="0" smtClean="0"/>
-              <a:t>Réceptacle à levure de 144 kilogrammes</a:t>
+              <a:t>1 réceptacle </a:t>
+            </a:r>
+            <a:r>
+              <a:rPr lang="fr-CH" dirty="0" smtClean="0"/>
+              <a:t>à levure de </a:t>
+            </a:r>
+            <a:r>
+              <a:rPr lang="fr-CH" dirty="0" smtClean="0"/>
+              <a:t>70 kg</a:t>
             </a:r>
           </a:p>
           <a:p>
             <a:pPr lvl="1"/>
             <a:r>
+              <a:rPr lang="fr-CH" dirty="0"/>
+              <a:t>1 réceptacle à épices de 150 </a:t>
+            </a:r>
+            <a:r>
               <a:rPr lang="fr-CH" dirty="0" smtClean="0"/>
-              <a:t>Réceptacle à miel de 200 kilogrammes</a:t>
-            </a:r>
+              <a:t>kg</a:t>
+            </a:r>
+            <a:endParaRPr lang="fr-CH" dirty="0" smtClean="0"/>
           </a:p>
           <a:p>
             <a:pPr lvl="1"/>
             <a:r>
               <a:rPr lang="fr-CH" dirty="0" smtClean="0"/>
-              <a:t>Réceptacle à épices de 400 kilogrammes</a:t>
-            </a:r>
-          </a:p>
-          <a:p>
+              <a:t>1 étagère permettant de stocker 75 pots de miel</a:t>
+            </a:r>
+          </a:p>
+          <a:p>
+            <a:pPr lvl="1"/>
             <a:r>
               <a:rPr lang="fr-CH" dirty="0" smtClean="0"/>
-              <a:t>Entrepôt produits finis de 72’000 unités</a:t>
-            </a:r>
+              <a:t>1 étagère permettant d’accueillir 25’000 récipients vides</a:t>
+            </a:r>
+            <a:endParaRPr lang="fr-CH" dirty="0" smtClean="0"/>
+          </a:p>
+          <a:p>
+            <a:r>
+              <a:rPr lang="fr-CH" dirty="0" smtClean="0"/>
+              <a:t>Entrepôt B d’une capacité de 50’000 unités</a:t>
+            </a:r>
+            <a:endParaRPr lang="fr-CH" dirty="0" smtClean="0"/>
           </a:p>
           <a:p>
             <a:r>
@@ -19749,16 +19862,8 @@
           <a:lstStyle/>
           <a:p>
             <a:r>
-              <a:rPr lang="fr-FR" dirty="0" err="1" smtClean="0"/>
-              <a:t>Cha</a:t>
-            </a:r>
-            <a:r>
-              <a:rPr lang="fr-CH" dirty="0" err="1" smtClean="0"/>
-              <a:t>îne</a:t>
-            </a:r>
-            <a:r>
-              <a:rPr lang="fr-CH" dirty="0" smtClean="0"/>
-              <a:t> de valeur</a:t>
+              <a:rPr lang="fr-FR" smtClean="0"/>
+              <a:t>Production</a:t>
             </a:r>
             <a:endParaRPr lang="fr-FR" dirty="0"/>
           </a:p>
@@ -19802,21 +19907,53 @@
           <a:p>
             <a:r>
               <a:rPr lang="fr-FR" dirty="0" smtClean="0"/>
-              <a:t>Chaque semaine vos lignes produisent 4’000 litres de bière</a:t>
+              <a:t>Chaque semaine vos lignes produisent </a:t>
+            </a:r>
+            <a:r>
+              <a:rPr lang="fr-FR" dirty="0" smtClean="0"/>
+              <a:t>3’000 </a:t>
+            </a:r>
+            <a:r>
+              <a:rPr lang="fr-FR" dirty="0" smtClean="0"/>
+              <a:t>litres de bière</a:t>
             </a:r>
           </a:p>
           <a:p>
             <a:pPr lvl="1"/>
             <a:r>
               <a:rPr lang="fr-FR" dirty="0" smtClean="0"/>
-              <a:t>Capacité totale de vos trois lignes : 12’000 litres</a:t>
+              <a:t>Capacité totale de vos trois lignes : </a:t>
+            </a:r>
+            <a:r>
+              <a:rPr lang="fr-FR" dirty="0"/>
+              <a:t>9</a:t>
+            </a:r>
+            <a:r>
+              <a:rPr lang="fr-FR" dirty="0" smtClean="0"/>
+              <a:t>’000 </a:t>
+            </a:r>
+            <a:r>
+              <a:rPr lang="fr-FR" dirty="0" smtClean="0"/>
+              <a:t>litres</a:t>
             </a:r>
           </a:p>
           <a:p>
             <a:pPr lvl="1"/>
             <a:r>
               <a:rPr lang="fr-FR" dirty="0" smtClean="0"/>
-              <a:t>24’000 cannettes ou 48’000 bouteilles</a:t>
+              <a:t>18’000 </a:t>
+            </a:r>
+            <a:r>
+              <a:rPr lang="fr-FR" dirty="0" smtClean="0"/>
+              <a:t>cannettes ou </a:t>
+            </a:r>
+            <a:r>
+              <a:rPr lang="fr-FR" dirty="0" smtClean="0"/>
+              <a:t>36’000 </a:t>
+            </a:r>
+            <a:r>
+              <a:rPr lang="fr-FR" dirty="0" smtClean="0"/>
+              <a:t>bouteilles</a:t>
             </a:r>
             <a:endParaRPr lang="fr-FR" dirty="0"/>
           </a:p>

</xml_diff>